<commit_message>
SRS dan PPT nya sudah diperbaiki, silahkan dicek kembali terimakasih
</commit_message>
<xml_diff>
--- a/MCKL program.pptx
+++ b/MCKL program.pptx
@@ -3471,7 +3471,7 @@
           <a:bodyPr/>
           <a:lstStyle/>
           <a:p>
-            <a:pPr marL="0" indent="0">
+            <a:pPr marL="0" indent="0" algn="just">
               <a:buNone/>
             </a:pPr>
             <a:r>
@@ -3480,7 +3480,7 @@
             </a:r>
           </a:p>
           <a:p>
-            <a:pPr marL="0" indent="0">
+            <a:pPr marL="0" indent="0" algn="just">
               <a:buNone/>
             </a:pPr>
             <a:endParaRPr lang="id-ID" dirty="0"/>
@@ -4275,12 +4275,12 @@
                         </a:spcAft>
                       </a:pPr>
                       <a:r>
-                        <a:rPr lang="id-ID" sz="1000">
+                        <a:rPr lang="id-ID" sz="1000" dirty="0">
                           <a:effectLst/>
                         </a:rPr>
                         <a:t>ID</a:t>
                       </a:r>
-                      <a:endParaRPr lang="id-ID" sz="1000">
+                      <a:endParaRPr lang="id-ID" sz="1000" dirty="0">
                         <a:effectLst/>
                         <a:latin typeface="Times New Roman"/>
                         <a:ea typeface="Times New Roman"/>
@@ -4404,12 +4404,12 @@
                         </a:spcAft>
                       </a:pPr>
                       <a:r>
-                        <a:rPr lang="id-ID" sz="1000">
+                        <a:rPr lang="id-ID" sz="1000" dirty="0">
                           <a:effectLst/>
                         </a:rPr>
                         <a:t>Sistem tidak menggunakan akses jaringan saat pengoprasian</a:t>
                       </a:r>
-                      <a:endParaRPr lang="id-ID" sz="1000">
+                      <a:endParaRPr lang="id-ID" sz="1000" dirty="0">
                         <a:effectLst/>
                         <a:latin typeface="Times New Roman"/>
                         <a:ea typeface="Times New Roman"/>
@@ -4597,7 +4597,7 @@
           </a:bodyPr>
           <a:lstStyle/>
           <a:p>
-            <a:pPr marL="0" indent="0">
+            <a:pPr marL="0" indent="0" algn="just">
               <a:buNone/>
             </a:pPr>
             <a:r>
@@ -4607,7 +4607,7 @@
             <a:endParaRPr lang="id-ID" b="1" dirty="0" smtClean="0"/>
           </a:p>
           <a:p>
-            <a:pPr marL="0" indent="0">
+            <a:pPr marL="0" indent="0" algn="just">
               <a:buNone/>
             </a:pPr>
             <a:r>
@@ -4617,7 +4617,7 @@
             <a:endParaRPr lang="id-ID" b="1" dirty="0"/>
           </a:p>
           <a:p>
-            <a:pPr marL="79693" indent="0">
+            <a:pPr marL="79693" indent="0" algn="just">
               <a:buNone/>
             </a:pPr>
             <a:r>
@@ -4631,7 +4631,7 @@
             <a:endParaRPr lang="id-ID" dirty="0"/>
           </a:p>
           <a:p>
-            <a:pPr marL="79693" indent="0">
+            <a:pPr marL="79693" indent="0" algn="just">
               <a:buNone/>
             </a:pPr>
             <a:r>
@@ -4640,7 +4640,7 @@
             </a:r>
           </a:p>
           <a:p>
-            <a:pPr marL="79693" indent="0">
+            <a:pPr marL="79693" indent="0" algn="just">
               <a:buNone/>
             </a:pPr>
             <a:r>
@@ -4649,7 +4649,7 @@
             </a:r>
           </a:p>
           <a:p>
-            <a:pPr marL="79693" indent="0">
+            <a:pPr marL="79693" indent="0" algn="just">
               <a:buNone/>
             </a:pPr>
             <a:r>
@@ -4666,7 +4666,7 @@
             </a:r>
           </a:p>
           <a:p>
-            <a:pPr marL="79693" indent="0">
+            <a:pPr marL="79693" indent="0" algn="just">
               <a:buNone/>
             </a:pPr>
             <a:r>
@@ -4675,7 +4675,7 @@
             </a:r>
           </a:p>
           <a:p>
-            <a:pPr marL="79693" indent="0">
+            <a:pPr marL="79693" indent="0" algn="just">
               <a:buNone/>
             </a:pPr>
             <a:r>
@@ -4684,7 +4684,7 @@
             </a:r>
           </a:p>
           <a:p>
-            <a:pPr marL="0" indent="0">
+            <a:pPr marL="0" indent="0" algn="just">
               <a:buNone/>
             </a:pPr>
             <a:endParaRPr lang="id-ID" dirty="0"/>
@@ -4763,6 +4763,7 @@
           <a:bodyPr/>
           <a:lstStyle/>
           <a:p>
+            <a:pPr algn="just"/>
             <a:r>
               <a:rPr lang="id-ID" b="1" dirty="0" smtClean="0"/>
               <a:t>1. Perangkat </a:t>
@@ -4773,7 +4774,7 @@
             </a:r>
           </a:p>
           <a:p>
-            <a:pPr marL="0" indent="0">
+            <a:pPr marL="0" indent="0" algn="just">
               <a:buNone/>
             </a:pPr>
             <a:r>
@@ -4790,7 +4791,7 @@
             </a:r>
           </a:p>
           <a:p>
-            <a:pPr marL="0" indent="0">
+            <a:pPr marL="0" indent="0" algn="just">
               <a:buNone/>
             </a:pPr>
             <a:r>
@@ -4799,7 +4800,7 @@
             </a:r>
           </a:p>
           <a:p>
-            <a:pPr marL="0" indent="0">
+            <a:pPr marL="0" indent="0" algn="just">
               <a:buNone/>
             </a:pPr>
             <a:r>
@@ -4813,14 +4814,14 @@
             <a:endParaRPr lang="id-ID" dirty="0"/>
           </a:p>
           <a:p>
-            <a:pPr marL="265113"/>
+            <a:pPr marL="265113" algn="just"/>
             <a:r>
               <a:rPr lang="id-ID" dirty="0"/>
               <a:t>2. Perangkat lunak yang digunakan dalam penerapan aplikasi adalah : </a:t>
             </a:r>
           </a:p>
           <a:p>
-            <a:pPr marL="0" indent="0">
+            <a:pPr marL="0" indent="0" algn="just">
               <a:buNone/>
             </a:pPr>
             <a:r>
@@ -4837,7 +4838,7 @@
             </a:r>
           </a:p>
           <a:p>
-            <a:pPr marL="0" indent="0">
+            <a:pPr marL="0" indent="0" algn="just">
               <a:buNone/>
             </a:pPr>
             <a:endParaRPr lang="id-ID" dirty="0"/>
@@ -4891,7 +4892,7 @@
           </a:bodyPr>
           <a:lstStyle/>
           <a:p>
-            <a:pPr marL="0" indent="0">
+            <a:pPr marL="0" indent="0" algn="just">
               <a:buNone/>
             </a:pPr>
             <a:r>
@@ -4904,7 +4905,7 @@
             </a:r>
           </a:p>
           <a:p>
-            <a:pPr marL="265113"/>
+            <a:pPr marL="265113" algn="just"/>
             <a:r>
               <a:rPr lang="id-ID" dirty="0"/>
               <a:t>a) Analis Sistem </a:t>
@@ -4932,7 +4933,7 @@
             <a:endParaRPr lang="id-ID" dirty="0"/>
           </a:p>
           <a:p>
-            <a:pPr marL="265113"/>
+            <a:pPr marL="265113" algn="just"/>
             <a:r>
               <a:rPr lang="id-ID" dirty="0"/>
               <a:t>b) Programmer sebagai pembuat program, mengubah spesifikasi sistem ke </a:t>
@@ -4944,7 +4945,7 @@
             <a:endParaRPr lang="id-ID" dirty="0"/>
           </a:p>
           <a:p>
-            <a:pPr marL="0" indent="0">
+            <a:pPr marL="0" indent="0" algn="just">
               <a:buNone/>
             </a:pPr>
             <a:r>
@@ -4953,21 +4954,21 @@
             </a:r>
           </a:p>
           <a:p>
-            <a:pPr marL="265113"/>
+            <a:pPr marL="265113" algn="just"/>
             <a:r>
               <a:rPr lang="id-ID" dirty="0"/>
               <a:t>b) Pengguna aplikasi itu sendiri </a:t>
             </a:r>
           </a:p>
           <a:p>
-            <a:pPr marL="265113"/>
+            <a:pPr marL="265113" algn="just"/>
             <a:r>
               <a:rPr lang="id-ID" dirty="0"/>
               <a:t>c) Pelajar dan Masyarakat Umum</a:t>
             </a:r>
           </a:p>
           <a:p>
-            <a:pPr marL="0" indent="0">
+            <a:pPr marL="0" indent="0" algn="just">
               <a:buNone/>
             </a:pPr>
             <a:endParaRPr lang="id-ID" dirty="0"/>

</xml_diff>